<commit_message>
perf: add a current limiting resistor for the Speaker
</commit_message>
<xml_diff>
--- a/打印图.pptx
+++ b/打印图.pptx
@@ -197,7 +197,7 @@
           <a:p>
             <a:fld id="{E1B3AE85-8D85-40AE-B32A-2EF161584654}" type="datetimeFigureOut">
               <a:rPr lang="zh-CN" altLang="en-US" smtClean="0"/>
-              <a:t>2025/2/28</a:t>
+              <a:t>2025/3/26</a:t>
             </a:fld>
             <a:endParaRPr lang="zh-CN" altLang="en-US"/>
           </a:p>
@@ -708,7 +708,7 @@
           <a:p>
             <a:fld id="{2DBD44B7-BCBE-4A9A-8B60-E87C372D1D4E}" type="datetimeFigureOut">
               <a:rPr lang="zh-CN" altLang="en-US" smtClean="0"/>
-              <a:t>2025/2/28</a:t>
+              <a:t>2025/3/26</a:t>
             </a:fld>
             <a:endParaRPr lang="zh-CN" altLang="en-US"/>
           </a:p>
@@ -878,7 +878,7 @@
           <a:p>
             <a:fld id="{2DBD44B7-BCBE-4A9A-8B60-E87C372D1D4E}" type="datetimeFigureOut">
               <a:rPr lang="zh-CN" altLang="en-US" smtClean="0"/>
-              <a:t>2025/2/28</a:t>
+              <a:t>2025/3/26</a:t>
             </a:fld>
             <a:endParaRPr lang="zh-CN" altLang="en-US"/>
           </a:p>
@@ -1058,7 +1058,7 @@
           <a:p>
             <a:fld id="{2DBD44B7-BCBE-4A9A-8B60-E87C372D1D4E}" type="datetimeFigureOut">
               <a:rPr lang="zh-CN" altLang="en-US" smtClean="0"/>
-              <a:t>2025/2/28</a:t>
+              <a:t>2025/3/26</a:t>
             </a:fld>
             <a:endParaRPr lang="zh-CN" altLang="en-US"/>
           </a:p>
@@ -1301,7 +1301,7 @@
           <a:p>
             <a:fld id="{2DBD44B7-BCBE-4A9A-8B60-E87C372D1D4E}" type="datetimeFigureOut">
               <a:rPr lang="zh-CN" altLang="en-US" smtClean="0"/>
-              <a:t>2025/2/28</a:t>
+              <a:t>2025/3/26</a:t>
             </a:fld>
             <a:endParaRPr lang="zh-CN" altLang="en-US"/>
           </a:p>
@@ -1545,7 +1545,7 @@
           <a:p>
             <a:fld id="{2DBD44B7-BCBE-4A9A-8B60-E87C372D1D4E}" type="datetimeFigureOut">
               <a:rPr lang="zh-CN" altLang="en-US" smtClean="0"/>
-              <a:t>2025/2/28</a:t>
+              <a:t>2025/3/26</a:t>
             </a:fld>
             <a:endParaRPr lang="zh-CN" altLang="en-US"/>
           </a:p>
@@ -1777,7 +1777,7 @@
           <a:p>
             <a:fld id="{2DBD44B7-BCBE-4A9A-8B60-E87C372D1D4E}" type="datetimeFigureOut">
               <a:rPr lang="zh-CN" altLang="en-US" smtClean="0"/>
-              <a:t>2025/2/28</a:t>
+              <a:t>2025/3/26</a:t>
             </a:fld>
             <a:endParaRPr lang="zh-CN" altLang="en-US"/>
           </a:p>
@@ -2144,7 +2144,7 @@
           <a:p>
             <a:fld id="{2DBD44B7-BCBE-4A9A-8B60-E87C372D1D4E}" type="datetimeFigureOut">
               <a:rPr lang="zh-CN" altLang="en-US" smtClean="0"/>
-              <a:t>2025/2/28</a:t>
+              <a:t>2025/3/26</a:t>
             </a:fld>
             <a:endParaRPr lang="zh-CN" altLang="en-US"/>
           </a:p>
@@ -2262,7 +2262,7 @@
           <a:p>
             <a:fld id="{2DBD44B7-BCBE-4A9A-8B60-E87C372D1D4E}" type="datetimeFigureOut">
               <a:rPr lang="zh-CN" altLang="en-US" smtClean="0"/>
-              <a:t>2025/2/28</a:t>
+              <a:t>2025/3/26</a:t>
             </a:fld>
             <a:endParaRPr lang="zh-CN" altLang="en-US"/>
           </a:p>
@@ -2357,7 +2357,7 @@
           <a:p>
             <a:fld id="{2DBD44B7-BCBE-4A9A-8B60-E87C372D1D4E}" type="datetimeFigureOut">
               <a:rPr lang="zh-CN" altLang="en-US" smtClean="0"/>
-              <a:t>2025/2/28</a:t>
+              <a:t>2025/3/26</a:t>
             </a:fld>
             <a:endParaRPr lang="zh-CN" altLang="en-US"/>
           </a:p>
@@ -2634,7 +2634,7 @@
           <a:p>
             <a:fld id="{2DBD44B7-BCBE-4A9A-8B60-E87C372D1D4E}" type="datetimeFigureOut">
               <a:rPr lang="zh-CN" altLang="en-US" smtClean="0"/>
-              <a:t>2025/2/28</a:t>
+              <a:t>2025/3/26</a:t>
             </a:fld>
             <a:endParaRPr lang="zh-CN" altLang="en-US"/>
           </a:p>
@@ -2891,7 +2891,7 @@
           <a:p>
             <a:fld id="{2DBD44B7-BCBE-4A9A-8B60-E87C372D1D4E}" type="datetimeFigureOut">
               <a:rPr lang="zh-CN" altLang="en-US" smtClean="0"/>
-              <a:t>2025/2/28</a:t>
+              <a:t>2025/3/26</a:t>
             </a:fld>
             <a:endParaRPr lang="zh-CN" altLang="en-US"/>
           </a:p>
@@ -3104,7 +3104,7 @@
           <a:p>
             <a:fld id="{2DBD44B7-BCBE-4A9A-8B60-E87C372D1D4E}" type="datetimeFigureOut">
               <a:rPr lang="zh-CN" altLang="en-US" smtClean="0"/>
-              <a:t>2025/2/28</a:t>
+              <a:t>2025/3/26</a:t>
             </a:fld>
             <a:endParaRPr lang="zh-CN" altLang="en-US"/>
           </a:p>
@@ -3518,53 +3518,6 @@
       </p:grpSpPr>
       <p:pic>
         <p:nvPicPr>
-          <p:cNvPr id="1026" name="Picture 2">
-            <a:extLst>
-              <a:ext uri="{FF2B5EF4-FFF2-40B4-BE49-F238E27FC236}">
-                <a16:creationId xmlns:a16="http://schemas.microsoft.com/office/drawing/2014/main" id="{1BBD5BC5-7C14-F878-A9D1-85B5D6CFC4B3}"/>
-              </a:ext>
-            </a:extLst>
-          </p:cNvPr>
-          <p:cNvPicPr>
-            <a:picLocks noChangeAspect="1" noChangeArrowheads="1"/>
-          </p:cNvPicPr>
-          <p:nvPr/>
-        </p:nvPicPr>
-        <p:blipFill>
-          <a:blip r:embed="rId4">
-            <a:extLst>
-              <a:ext uri="{28A0092B-C50C-407E-A947-70E740481C1C}">
-                <a14:useLocalDpi xmlns:a14="http://schemas.microsoft.com/office/drawing/2010/main" val="0"/>
-              </a:ext>
-            </a:extLst>
-          </a:blip>
-          <a:srcRect/>
-          <a:stretch>
-            <a:fillRect/>
-          </a:stretch>
-        </p:blipFill>
-        <p:spPr bwMode="auto">
-          <a:xfrm>
-            <a:off x="5046754" y="185635"/>
-            <a:ext cx="3742859" cy="2817416"/>
-          </a:xfrm>
-          <a:prstGeom prst="rect">
-            <a:avLst/>
-          </a:prstGeom>
-          <a:noFill/>
-          <a:extLst>
-            <a:ext uri="{909E8E84-426E-40DD-AFC4-6F175D3DCCD1}">
-              <a14:hiddenFill xmlns:a14="http://schemas.microsoft.com/office/drawing/2010/main">
-                <a:solidFill>
-                  <a:srgbClr val="FFFFFF"/>
-                </a:solidFill>
-              </a14:hiddenFill>
-            </a:ext>
-          </a:extLst>
-        </p:spPr>
-      </p:pic>
-      <p:pic>
-        <p:nvPicPr>
           <p:cNvPr id="73" name="图片 72" descr="复旦大学微电子学院芯创讲师团">
             <a:extLst>
               <a:ext uri="{FF2B5EF4-FFF2-40B4-BE49-F238E27FC236}">
@@ -3578,7 +3531,7 @@
           <p:nvPr/>
         </p:nvPicPr>
         <p:blipFill>
-          <a:blip r:embed="rId5">
+          <a:blip r:embed="rId4">
             <a:lum bright="12000" contrast="-12000"/>
           </a:blip>
           <a:srcRect l="24353" t="13598" r="23764" b="35672"/>
@@ -3590,36 +3543,6 @@
           <a:xfrm>
             <a:off x="292153" y="248061"/>
             <a:ext cx="776486" cy="759976"/>
-          </a:xfrm>
-          <a:prstGeom prst="rect">
-            <a:avLst/>
-          </a:prstGeom>
-        </p:spPr>
-      </p:pic>
-      <p:pic>
-        <p:nvPicPr>
-          <p:cNvPr id="10" name="图片 9">
-            <a:extLst>
-              <a:ext uri="{FF2B5EF4-FFF2-40B4-BE49-F238E27FC236}">
-                <a16:creationId xmlns:a16="http://schemas.microsoft.com/office/drawing/2014/main" id="{C5714496-4A02-F155-F558-A14CB89A608F}"/>
-              </a:ext>
-            </a:extLst>
-          </p:cNvPr>
-          <p:cNvPicPr>
-            <a:picLocks noChangeAspect="1"/>
-          </p:cNvPicPr>
-          <p:nvPr/>
-        </p:nvPicPr>
-        <p:blipFill>
-          <a:blip r:embed="rId6"/>
-          <a:stretch>
-            <a:fillRect/>
-          </a:stretch>
-        </p:blipFill>
-        <p:spPr>
-          <a:xfrm>
-            <a:off x="1404094" y="3407764"/>
-            <a:ext cx="2951131" cy="2841765"/>
           </a:xfrm>
           <a:prstGeom prst="rect">
             <a:avLst/>
@@ -3641,7 +3564,7 @@
           <p:nvPr/>
         </p:nvPicPr>
         <p:blipFill>
-          <a:blip r:embed="rId7"/>
+          <a:blip r:embed="rId5"/>
           <a:stretch>
             <a:fillRect/>
           </a:stretch>
@@ -3694,114 +3617,6 @@
       </p:sp>
       <p:sp>
         <p:nvSpPr>
-          <p:cNvPr id="15" name="文本框 14">
-            <a:extLst>
-              <a:ext uri="{FF2B5EF4-FFF2-40B4-BE49-F238E27FC236}">
-                <a16:creationId xmlns:a16="http://schemas.microsoft.com/office/drawing/2014/main" id="{66DFBD20-A359-7D34-DCF7-BD4C81E34026}"/>
-              </a:ext>
-            </a:extLst>
-          </p:cNvPr>
-          <p:cNvSpPr txBox="1"/>
-          <p:nvPr/>
-        </p:nvSpPr>
-        <p:spPr>
-          <a:xfrm>
-            <a:off x="1715909" y="5116830"/>
-            <a:ext cx="620165" cy="317331"/>
-          </a:xfrm>
-          <a:prstGeom prst="rect">
-            <a:avLst/>
-          </a:prstGeom>
-          <a:noFill/>
-        </p:spPr>
-        <p:txBody>
-          <a:bodyPr wrap="square" rtlCol="0">
-            <a:spAutoFit/>
-          </a:bodyPr>
-          <a:lstStyle/>
-          <a:p>
-            <a:r>
-              <a:rPr lang="en-US" altLang="zh-CN" sz="1462" dirty="0"/>
-              <a:t>200k</a:t>
-            </a:r>
-            <a:endParaRPr lang="zh-CN" altLang="en-US" sz="1462" dirty="0"/>
-          </a:p>
-        </p:txBody>
-      </p:sp>
-      <p:sp>
-        <p:nvSpPr>
-          <p:cNvPr id="16" name="文本框 15">
-            <a:extLst>
-              <a:ext uri="{FF2B5EF4-FFF2-40B4-BE49-F238E27FC236}">
-                <a16:creationId xmlns:a16="http://schemas.microsoft.com/office/drawing/2014/main" id="{43AFECC6-159C-FD4E-0AF3-6039B4E02CF0}"/>
-              </a:ext>
-            </a:extLst>
-          </p:cNvPr>
-          <p:cNvSpPr txBox="1"/>
-          <p:nvPr/>
-        </p:nvSpPr>
-        <p:spPr>
-          <a:xfrm>
-            <a:off x="1229478" y="4727293"/>
-            <a:ext cx="620165" cy="317331"/>
-          </a:xfrm>
-          <a:prstGeom prst="rect">
-            <a:avLst/>
-          </a:prstGeom>
-          <a:noFill/>
-        </p:spPr>
-        <p:txBody>
-          <a:bodyPr wrap="square" rtlCol="0">
-            <a:spAutoFit/>
-          </a:bodyPr>
-          <a:lstStyle/>
-          <a:p>
-            <a:r>
-              <a:rPr lang="en-US" altLang="zh-CN" sz="1462" dirty="0"/>
-              <a:t>100k</a:t>
-            </a:r>
-            <a:endParaRPr lang="zh-CN" altLang="en-US" sz="1462" dirty="0"/>
-          </a:p>
-        </p:txBody>
-      </p:sp>
-      <p:sp>
-        <p:nvSpPr>
-          <p:cNvPr id="17" name="文本框 16">
-            <a:extLst>
-              <a:ext uri="{FF2B5EF4-FFF2-40B4-BE49-F238E27FC236}">
-                <a16:creationId xmlns:a16="http://schemas.microsoft.com/office/drawing/2014/main" id="{4E2F8592-8048-9942-D1A9-C9A4DB4EC845}"/>
-              </a:ext>
-            </a:extLst>
-          </p:cNvPr>
-          <p:cNvSpPr txBox="1"/>
-          <p:nvPr/>
-        </p:nvSpPr>
-        <p:spPr>
-          <a:xfrm>
-            <a:off x="1969211" y="5446306"/>
-            <a:ext cx="528542" cy="317331"/>
-          </a:xfrm>
-          <a:prstGeom prst="rect">
-            <a:avLst/>
-          </a:prstGeom>
-          <a:noFill/>
-        </p:spPr>
-        <p:txBody>
-          <a:bodyPr wrap="square" rtlCol="0">
-            <a:spAutoFit/>
-          </a:bodyPr>
-          <a:lstStyle/>
-          <a:p>
-            <a:r>
-              <a:rPr lang="en-US" altLang="zh-CN" sz="1462" dirty="0"/>
-              <a:t>10u</a:t>
-            </a:r>
-            <a:endParaRPr lang="zh-CN" altLang="en-US" sz="1462" dirty="0"/>
-          </a:p>
-        </p:txBody>
-      </p:sp>
-      <p:sp>
-        <p:nvSpPr>
           <p:cNvPr id="6" name="文本框 5">
             <a:extLst>
               <a:ext uri="{FF2B5EF4-FFF2-40B4-BE49-F238E27FC236}">
@@ -3947,10 +3762,104 @@
       </p:sp>
       <p:pic>
         <p:nvPicPr>
-          <p:cNvPr id="13" name="图片 12" descr="c10666c9d060da6a550ca46783485dd">
+          <p:cNvPr id="2" name="Picture 2">
             <a:extLst>
               <a:ext uri="{FF2B5EF4-FFF2-40B4-BE49-F238E27FC236}">
-                <a16:creationId xmlns:a16="http://schemas.microsoft.com/office/drawing/2014/main" id="{AF1B0DBE-71DD-D4E3-6F7F-309B75011632}"/>
+                <a16:creationId xmlns:a16="http://schemas.microsoft.com/office/drawing/2014/main" id="{3B15A454-0845-6457-9F60-B169BEC932EF}"/>
+              </a:ext>
+            </a:extLst>
+          </p:cNvPr>
+          <p:cNvPicPr>
+            <a:picLocks noChangeAspect="1" noChangeArrowheads="1"/>
+          </p:cNvPicPr>
+          <p:nvPr/>
+        </p:nvPicPr>
+        <p:blipFill>
+          <a:blip r:embed="rId6">
+            <a:extLst>
+              <a:ext uri="{28A0092B-C50C-407E-A947-70E740481C1C}">
+                <a14:useLocalDpi xmlns:a14="http://schemas.microsoft.com/office/drawing/2010/main" val="0"/>
+              </a:ext>
+            </a:extLst>
+          </a:blip>
+          <a:srcRect/>
+          <a:stretch>
+            <a:fillRect/>
+          </a:stretch>
+        </p:blipFill>
+        <p:spPr bwMode="auto">
+          <a:xfrm>
+            <a:off x="5181599" y="218118"/>
+            <a:ext cx="3533775" cy="2786259"/>
+          </a:xfrm>
+          <a:prstGeom prst="rect">
+            <a:avLst/>
+          </a:prstGeom>
+          <a:noFill/>
+          <a:extLst>
+            <a:ext uri="{909E8E84-426E-40DD-AFC4-6F175D3DCCD1}">
+              <a14:hiddenFill xmlns:a14="http://schemas.microsoft.com/office/drawing/2010/main">
+                <a:solidFill>
+                  <a:srgbClr val="FFFFFF"/>
+                </a:solidFill>
+              </a14:hiddenFill>
+            </a:ext>
+          </a:extLst>
+        </p:spPr>
+      </p:pic>
+      <p:pic>
+        <p:nvPicPr>
+          <p:cNvPr id="1028" name="Picture 4">
+            <a:extLst>
+              <a:ext uri="{FF2B5EF4-FFF2-40B4-BE49-F238E27FC236}">
+                <a16:creationId xmlns:a16="http://schemas.microsoft.com/office/drawing/2014/main" id="{140D3B46-4391-3037-D482-45436D3E32A5}"/>
+              </a:ext>
+            </a:extLst>
+          </p:cNvPr>
+          <p:cNvPicPr>
+            <a:picLocks noChangeAspect="1" noChangeArrowheads="1"/>
+          </p:cNvPicPr>
+          <p:nvPr/>
+        </p:nvPicPr>
+        <p:blipFill>
+          <a:blip r:embed="rId7">
+            <a:extLst>
+              <a:ext uri="{28A0092B-C50C-407E-A947-70E740481C1C}">
+                <a14:useLocalDpi xmlns:a14="http://schemas.microsoft.com/office/drawing/2010/main" val="0"/>
+              </a:ext>
+            </a:extLst>
+          </a:blip>
+          <a:srcRect/>
+          <a:stretch>
+            <a:fillRect/>
+          </a:stretch>
+        </p:blipFill>
+        <p:spPr bwMode="auto">
+          <a:xfrm>
+            <a:off x="1402014" y="3450470"/>
+            <a:ext cx="2845961" cy="2784722"/>
+          </a:xfrm>
+          <a:prstGeom prst="rect">
+            <a:avLst/>
+          </a:prstGeom>
+          <a:noFill/>
+          <a:extLst>
+            <a:ext uri="{909E8E84-426E-40DD-AFC4-6F175D3DCCD1}">
+              <a14:hiddenFill xmlns:a14="http://schemas.microsoft.com/office/drawing/2010/main">
+                <a:solidFill>
+                  <a:srgbClr val="FFFFFF"/>
+                </a:solidFill>
+              </a14:hiddenFill>
+            </a:ext>
+          </a:extLst>
+        </p:spPr>
+      </p:pic>
+      <p:pic>
+        <p:nvPicPr>
+          <p:cNvPr id="4" name="图片 3">
+            <a:extLst>
+              <a:ext uri="{FF2B5EF4-FFF2-40B4-BE49-F238E27FC236}">
+                <a16:creationId xmlns:a16="http://schemas.microsoft.com/office/drawing/2014/main" id="{B50EC318-79E1-BD50-F41B-6D387E00D4FB}"/>
               </a:ext>
             </a:extLst>
           </p:cNvPr>
@@ -3960,41 +3869,15 @@
           <p:nvPr/>
         </p:nvPicPr>
         <p:blipFill>
-          <a:blip r:embed="rId8">
-            <a:clrChange>
-              <a:clrFrom>
-                <a:srgbClr val="FFFFFF">
-                  <a:alpha val="100000"/>
-                </a:srgbClr>
-              </a:clrFrom>
-              <a:clrTo>
-                <a:srgbClr val="FFFFFF">
-                  <a:alpha val="100000"/>
-                  <a:alpha val="0"/>
-                </a:srgbClr>
-              </a:clrTo>
-            </a:clrChange>
-            <a:extLst>
-              <a:ext uri="{BEBA8EAE-BF5A-486C-A8C5-ECC9F3942E4B}">
-                <a14:imgProps xmlns:a14="http://schemas.microsoft.com/office/drawing/2010/main">
-                  <a14:imgLayer r:embed="rId9">
-                    <a14:imgEffect>
-                      <a14:sharpenSoften amount="30000"/>
-                    </a14:imgEffect>
-                  </a14:imgLayer>
-                </a14:imgProps>
-              </a:ext>
-            </a:extLst>
-          </a:blip>
-          <a:srcRect b="12075"/>
+          <a:blip r:embed="rId8"/>
           <a:stretch>
             <a:fillRect/>
           </a:stretch>
         </p:blipFill>
         <p:spPr>
           <a:xfrm>
-            <a:off x="4355225" y="3332033"/>
-            <a:ext cx="4819991" cy="2917496"/>
+            <a:off x="4615597" y="3332033"/>
+            <a:ext cx="4333400" cy="2924777"/>
           </a:xfrm>
           <a:prstGeom prst="rect">
             <a:avLst/>

</xml_diff>